<commit_message>
all page navigation bar edited
</commit_message>
<xml_diff>
--- a/images/roboticsCarousel.pptx
+++ b/images/roboticsCarousel.pptx
@@ -104,6 +104,11 @@
       </a:defRPr>
     </a:lvl9pPr>
   </p:defaultTextStyle>
+  <p:extLst>
+    <p:ext uri="{EFAFB233-063F-42B5-8137-9DF3F51BA10A}">
+      <p15:sldGuideLst xmlns:p15="http://schemas.microsoft.com/office/powerpoint/2012/main"/>
+    </p:ext>
+  </p:extLst>
 </p:presentation>
 </file>
 
@@ -2985,31 +2990,24 @@
         <a:gradFill flip="none" rotWithShape="1">
           <a:gsLst>
             <a:gs pos="0">
-              <a:schemeClr val="accent4">
-                <a:lumMod val="5000"/>
-                <a:lumOff val="95000"/>
+              <a:schemeClr val="accent6">
+                <a:lumMod val="67000"/>
               </a:schemeClr>
             </a:gs>
-            <a:gs pos="74000">
-              <a:schemeClr val="accent4">
-                <a:lumMod val="45000"/>
-                <a:lumOff val="55000"/>
-              </a:schemeClr>
-            </a:gs>
-            <a:gs pos="83000">
-              <a:schemeClr val="accent4">
-                <a:lumMod val="45000"/>
-                <a:lumOff val="55000"/>
+            <a:gs pos="48000">
+              <a:schemeClr val="accent6">
+                <a:lumMod val="97000"/>
+                <a:lumOff val="3000"/>
               </a:schemeClr>
             </a:gs>
             <a:gs pos="100000">
-              <a:schemeClr val="accent4">
-                <a:lumMod val="30000"/>
-                <a:lumOff val="70000"/>
+              <a:schemeClr val="accent6">
+                <a:lumMod val="60000"/>
+                <a:lumOff val="40000"/>
               </a:schemeClr>
             </a:gs>
           </a:gsLst>
-          <a:lin ang="5400000" scaled="1"/>
+          <a:lin ang="16200000" scaled="1"/>
           <a:tileRect/>
         </a:gradFill>
         <a:effectLst/>
@@ -3038,7 +3036,7 @@
         <p:spPr>
           <a:xfrm>
             <a:off x="468063" y="455870"/>
-            <a:ext cx="7382893" cy="2062103"/>
+            <a:ext cx="9963824" cy="646331"/>
           </a:xfrm>
           <a:prstGeom prst="rect">
             <a:avLst/>
@@ -3052,13 +3050,13 @@
           <a:lstStyle/>
           <a:p>
             <a:r>
-              <a:rPr lang="en-US" sz="3200" b="1" dirty="0" smtClean="0">
-                <a:latin typeface="Bahnschrift SemiLight" panose="020B0502040204020203" pitchFamily="34" charset="0"/>
+              <a:rPr lang="en-US" sz="3600" b="1" dirty="0" smtClean="0">
+                <a:latin typeface="Arial Black" panose="020B0A04020102020204" pitchFamily="34" charset="0"/>
               </a:rPr>
-              <a:t>Do  you know that researchers say that, a good handwriting activates the brain and develops the kid in all subject areas.</a:t>
-            </a:r>
-            <a:endParaRPr lang="en-IN" sz="3200" b="1" dirty="0">
-              <a:latin typeface="Bahnschrift SemiLight" panose="020B0502040204020203" pitchFamily="34" charset="0"/>
+              <a:t>How to solve puzzles in short time?</a:t>
+            </a:r>
+            <a:endParaRPr lang="en-IN" sz="3600" b="1" dirty="0">
+              <a:latin typeface="Arial Black" panose="020B0A04020102020204" pitchFamily="34" charset="0"/>
             </a:endParaRPr>
           </a:p>
         </p:txBody>
@@ -3071,7 +3069,7 @@
         </p:nvSpPr>
         <p:spPr>
           <a:xfrm>
-            <a:off x="648213" y="4866213"/>
+            <a:off x="2467527" y="5451208"/>
             <a:ext cx="5964895" cy="1200329"/>
           </a:xfrm>
           <a:prstGeom prst="rect">
@@ -3106,7 +3104,25 @@
               <a:rPr lang="en-US" sz="3600" b="1" dirty="0" smtClean="0">
                 <a:latin typeface="Arial Black" panose="020B0A04020102020204" pitchFamily="34" charset="0"/>
               </a:rPr>
-              <a:t>“Handwriting Course’’</a:t>
+              <a:t>“</a:t>
+            </a:r>
+            <a:r>
+              <a:rPr lang="en-US" sz="3600" b="1" dirty="0" smtClean="0">
+                <a:latin typeface="Arial Black" panose="020B0A04020102020204" pitchFamily="34" charset="0"/>
+              </a:rPr>
+              <a:t>Rubik’s Cube</a:t>
+            </a:r>
+            <a:r>
+              <a:rPr lang="en-US" sz="3600" b="1" dirty="0" smtClean="0">
+                <a:latin typeface="Arial Black" panose="020B0A04020102020204" pitchFamily="34" charset="0"/>
+              </a:rPr>
+              <a:t> </a:t>
+            </a:r>
+            <a:r>
+              <a:rPr lang="en-US" sz="3600" b="1" dirty="0" smtClean="0">
+                <a:latin typeface="Arial Black" panose="020B0A04020102020204" pitchFamily="34" charset="0"/>
+              </a:rPr>
+              <a:t>Course’’</a:t>
             </a:r>
             <a:endParaRPr lang="en-IN" sz="3600" b="1" dirty="0">
               <a:latin typeface="Arial Black" panose="020B0A04020102020204" pitchFamily="34" charset="0"/>
@@ -3116,14 +3132,14 @@
       </p:sp>
       <p:pic>
         <p:nvPicPr>
-          <p:cNvPr id="14" name="Picture 13"/>
+          <p:cNvPr id="2" name="Picture 1"/>
           <p:cNvPicPr>
             <a:picLocks noChangeAspect="1"/>
           </p:cNvPicPr>
           <p:nvPr/>
         </p:nvPicPr>
         <p:blipFill>
-          <a:blip r:embed="rId2">
+          <a:blip r:embed="rId2" cstate="print">
             <a:extLst>
               <a:ext uri="{28A0092B-C50C-407E-A947-70E740481C1C}">
                 <a14:useLocalDpi xmlns:a14="http://schemas.microsoft.com/office/drawing/2010/main" val="0"/>
@@ -3136,14 +3152,56 @@
         </p:blipFill>
         <p:spPr>
           <a:xfrm>
-            <a:off x="6485092" y="1774740"/>
-            <a:ext cx="5368588" cy="3834706"/>
+            <a:off x="339275" y="1425366"/>
+            <a:ext cx="3755249" cy="3702676"/>
           </a:xfrm>
           <a:prstGeom prst="rect">
             <a:avLst/>
           </a:prstGeom>
         </p:spPr>
       </p:pic>
+      <p:sp>
+        <p:nvSpPr>
+          <p:cNvPr id="3" name="TextBox 2"/>
+          <p:cNvSpPr txBox="1"/>
+          <p:nvPr/>
+        </p:nvSpPr>
+        <p:spPr>
+          <a:xfrm>
+            <a:off x="5449974" y="1425366"/>
+            <a:ext cx="6128133" cy="3170099"/>
+          </a:xfrm>
+          <a:prstGeom prst="rect">
+            <a:avLst/>
+          </a:prstGeom>
+          <a:noFill/>
+        </p:spPr>
+        <p:txBody>
+          <a:bodyPr wrap="square" rtlCol="0">
+            <a:spAutoFit/>
+          </a:bodyPr>
+          <a:lstStyle/>
+          <a:p>
+            <a:r>
+              <a:rPr lang="en-US" sz="4000" dirty="0" smtClean="0">
+                <a:latin typeface="Blackadder ITC" panose="04020505051007020D02" pitchFamily="82" charset="0"/>
+              </a:rPr>
+              <a:t>Let your child adopt a new hobby – Solving the Rubik’s Cube !</a:t>
+            </a:r>
+          </a:p>
+          <a:p>
+            <a:r>
+              <a:rPr lang="en-US" sz="4000" dirty="0" smtClean="0">
+                <a:latin typeface="Blackadder ITC" panose="04020505051007020D02" pitchFamily="82" charset="0"/>
+              </a:rPr>
+              <a:t>Its engaging and challenging, guaranteed to keep children focused and determined!</a:t>
+            </a:r>
+            <a:endParaRPr lang="en-IN" sz="4000" dirty="0">
+              <a:latin typeface="Blackadder ITC" panose="04020505051007020D02" pitchFamily="82" charset="0"/>
+            </a:endParaRPr>
+          </a:p>
+        </p:txBody>
+      </p:sp>
     </p:spTree>
     <p:extLst>
       <p:ext uri="{BB962C8B-B14F-4D97-AF65-F5344CB8AC3E}">

</xml_diff>